<commit_message>
sites aula 04 HTML
</commit_message>
<xml_diff>
--- a/01 Classes/Aula 04 Desenvolvimento Web - HTML.pptx
+++ b/01 Classes/Aula 04 Desenvolvimento Web - HTML.pptx
@@ -5,7 +5,7 @@
     <p:sldMasterId id="2147483648" r:id="rId1"/>
   </p:sldMasterIdLst>
   <p:notesMasterIdLst>
-    <p:notesMasterId r:id="rId52"/>
+    <p:notesMasterId r:id="rId53"/>
   </p:notesMasterIdLst>
   <p:sldIdLst>
     <p:sldId id="256" r:id="rId2"/>
@@ -53,11 +53,12 @@
     <p:sldId id="437" r:id="rId44"/>
     <p:sldId id="436" r:id="rId45"/>
     <p:sldId id="438" r:id="rId46"/>
-    <p:sldId id="333" r:id="rId47"/>
-    <p:sldId id="323" r:id="rId48"/>
-    <p:sldId id="334" r:id="rId49"/>
-    <p:sldId id="337" r:id="rId50"/>
-    <p:sldId id="309" r:id="rId51"/>
+    <p:sldId id="442" r:id="rId47"/>
+    <p:sldId id="333" r:id="rId48"/>
+    <p:sldId id="323" r:id="rId49"/>
+    <p:sldId id="334" r:id="rId50"/>
+    <p:sldId id="337" r:id="rId51"/>
+    <p:sldId id="309" r:id="rId52"/>
   </p:sldIdLst>
   <p:sldSz cx="9144000" cy="5143500" type="screen16x9"/>
   <p:notesSz cx="6858000" cy="9144000"/>
@@ -3107,7 +3108,7 @@
     </p:spTree>
     <p:extLst>
       <p:ext uri="{BB962C8B-B14F-4D97-AF65-F5344CB8AC3E}">
-        <p14:creationId xmlns:p14="http://schemas.microsoft.com/office/powerpoint/2010/main" val="585304384"/>
+        <p14:creationId xmlns:p14="http://schemas.microsoft.com/office/powerpoint/2010/main" val="1438828921"/>
       </p:ext>
     </p:extLst>
   </p:cSld>
@@ -3173,7 +3174,7 @@
     </p:spTree>
     <p:extLst>
       <p:ext uri="{BB962C8B-B14F-4D97-AF65-F5344CB8AC3E}">
-        <p14:creationId xmlns:p14="http://schemas.microsoft.com/office/powerpoint/2010/main" val="2709569597"/>
+        <p14:creationId xmlns:p14="http://schemas.microsoft.com/office/powerpoint/2010/main" val="585304384"/>
       </p:ext>
     </p:extLst>
   </p:cSld>
@@ -3239,6 +3240,72 @@
     </p:spTree>
     <p:extLst>
       <p:ext uri="{BB962C8B-B14F-4D97-AF65-F5344CB8AC3E}">
+        <p14:creationId xmlns:p14="http://schemas.microsoft.com/office/powerpoint/2010/main" val="2709569597"/>
+      </p:ext>
+    </p:extLst>
+  </p:cSld>
+  <p:clrMapOvr>
+    <a:masterClrMapping/>
+  </p:clrMapOvr>
+</p:notes>
+</file>
+
+<file path=ppt/notesSlides/notesSlide47.xml><?xml version="1.0" encoding="utf-8"?>
+<p:notes xmlns:a="http://schemas.openxmlformats.org/drawingml/2006/main" xmlns:r="http://schemas.openxmlformats.org/officeDocument/2006/relationships" xmlns:p="http://schemas.openxmlformats.org/presentationml/2006/main">
+  <p:cSld>
+    <p:spTree>
+      <p:nvGrpSpPr>
+        <p:cNvPr id="1" name=""/>
+        <p:cNvGrpSpPr/>
+        <p:nvPr/>
+      </p:nvGrpSpPr>
+      <p:grpSpPr>
+        <a:xfrm>
+          <a:off x="0" y="0"/>
+          <a:ext cx="0" cy="0"/>
+          <a:chOff x="0" y="0"/>
+          <a:chExt cx="0" cy="0"/>
+        </a:xfrm>
+      </p:grpSpPr>
+      <p:sp>
+        <p:nvSpPr>
+          <p:cNvPr id="2" name="Espaço Reservado para Imagem de Slide 1"/>
+          <p:cNvSpPr>
+            <a:spLocks noGrp="1" noRot="1" noChangeAspect="1"/>
+          </p:cNvSpPr>
+          <p:nvPr>
+            <p:ph type="sldImg"/>
+          </p:nvPr>
+        </p:nvSpPr>
+        <p:spPr>
+          <a:xfrm>
+            <a:off x="381000" y="685800"/>
+            <a:ext cx="6096000" cy="3429000"/>
+          </a:xfrm>
+        </p:spPr>
+      </p:sp>
+      <p:sp>
+        <p:nvSpPr>
+          <p:cNvPr id="3" name="Espaço Reservado para Anotações 2"/>
+          <p:cNvSpPr>
+            <a:spLocks noGrp="1"/>
+          </p:cNvSpPr>
+          <p:nvPr>
+            <p:ph type="body" idx="1"/>
+          </p:nvPr>
+        </p:nvSpPr>
+        <p:spPr/>
+        <p:txBody>
+          <a:bodyPr/>
+          <a:lstStyle/>
+          <a:p>
+            <a:endParaRPr lang="pt-BR" dirty="0"/>
+          </a:p>
+        </p:txBody>
+      </p:sp>
+    </p:spTree>
+    <p:extLst>
+      <p:ext uri="{BB962C8B-B14F-4D97-AF65-F5344CB8AC3E}">
         <p14:creationId xmlns:p14="http://schemas.microsoft.com/office/powerpoint/2010/main" val="2296249050"/>
       </p:ext>
     </p:extLst>
@@ -3249,7 +3316,7 @@
 </p:notes>
 </file>
 
-<file path=ppt/notesSlides/notesSlide47.xml><?xml version="1.0" encoding="utf-8"?>
+<file path=ppt/notesSlides/notesSlide48.xml><?xml version="1.0" encoding="utf-8"?>
 <p:notes xmlns:a="http://schemas.openxmlformats.org/drawingml/2006/main" xmlns:r="http://schemas.openxmlformats.org/officeDocument/2006/relationships" xmlns:p="http://schemas.openxmlformats.org/presentationml/2006/main">
   <p:cSld>
     <p:spTree>
@@ -21664,12 +21731,20 @@
           <a:lstStyle/>
           <a:p>
             <a:r>
+              <a:rPr lang="en-US" b="1" dirty="0">
+                <a:solidFill>
+                  <a:srgbClr val="0070C0"/>
+                </a:solidFill>
+              </a:rPr>
+              <a:t>HTML – </a:t>
+            </a:r>
+            <a:r>
               <a:rPr lang="en-US" b="1" dirty="0" err="1">
                 <a:solidFill>
                   <a:srgbClr val="0070C0"/>
                 </a:solidFill>
               </a:rPr>
-              <a:t>Leitura</a:t>
+              <a:t>Estatísticas</a:t>
             </a:r>
             <a:r>
               <a:rPr lang="en-US" b="1" dirty="0">
@@ -21677,7 +21752,7 @@
                   <a:srgbClr val="0070C0"/>
                 </a:solidFill>
               </a:rPr>
-              <a:t> </a:t>
+              <a:t>/</a:t>
             </a:r>
             <a:r>
               <a:rPr lang="en-US" b="1" dirty="0" err="1">
@@ -21685,7 +21760,7 @@
                   <a:srgbClr val="0070C0"/>
                 </a:solidFill>
               </a:rPr>
-              <a:t>Específica</a:t>
+              <a:t>Conteúdos</a:t>
             </a:r>
             <a:endParaRPr lang="en-US" b="1" dirty="0">
               <a:solidFill>
@@ -21707,8 +21782,8 @@
         </p:nvSpPr>
         <p:spPr>
           <a:xfrm>
-            <a:off x="142865" y="1012261"/>
-            <a:ext cx="8865056" cy="3394472"/>
+            <a:off x="142865" y="1024786"/>
+            <a:ext cx="8865056" cy="3900208"/>
           </a:xfrm>
         </p:spPr>
         <p:txBody>
@@ -21721,75 +21796,45 @@
               <a:buNone/>
             </a:pPr>
             <a:r>
-              <a:rPr lang="pt-BR" sz="2000" dirty="0">
-                <a:latin typeface="Times New Roman" panose="02020603050405020304" pitchFamily="18" charset="0"/>
-                <a:cs typeface="Times New Roman" panose="02020603050405020304" pitchFamily="18" charset="0"/>
-              </a:rPr>
-              <a:t>[1] </a:t>
-            </a:r>
-            <a:r>
-              <a:rPr lang="pt-BR" sz="2000" b="1" dirty="0">
-                <a:latin typeface="Times New Roman" panose="02020603050405020304" pitchFamily="18" charset="0"/>
-                <a:cs typeface="Times New Roman" panose="02020603050405020304" pitchFamily="18" charset="0"/>
-              </a:rPr>
-              <a:t>IKENO</a:t>
-            </a:r>
-            <a:r>
-              <a:rPr lang="pt-BR" sz="2000" dirty="0">
-                <a:latin typeface="Times New Roman" panose="02020603050405020304" pitchFamily="18" charset="0"/>
-                <a:cs typeface="Times New Roman" panose="02020603050405020304" pitchFamily="18" charset="0"/>
-              </a:rPr>
-              <a:t>, Sergio N.; DA COSTA MARCHI¹, </a:t>
-            </a:r>
-            <a:r>
-              <a:rPr lang="pt-BR" sz="2000" dirty="0" err="1">
-                <a:latin typeface="Times New Roman" panose="02020603050405020304" pitchFamily="18" charset="0"/>
-                <a:cs typeface="Times New Roman" panose="02020603050405020304" pitchFamily="18" charset="0"/>
-              </a:rPr>
-              <a:t>Késsia</a:t>
-            </a:r>
-            <a:r>
-              <a:rPr lang="pt-BR" sz="2000" dirty="0">
-                <a:latin typeface="Times New Roman" panose="02020603050405020304" pitchFamily="18" charset="0"/>
-                <a:cs typeface="Times New Roman" panose="02020603050405020304" pitchFamily="18" charset="0"/>
-              </a:rPr>
-              <a:t> Rita. Análise da Nova Linguagem HTML5 para o Desenvolvimento Web.</a:t>
-            </a:r>
-          </a:p>
-          <a:p>
-            <a:pPr marL="0" indent="0" algn="just">
-              <a:buNone/>
-            </a:pPr>
-            <a:r>
-              <a:rPr lang="pt-BR" sz="2000" dirty="0">
-                <a:latin typeface="Times New Roman" panose="02020603050405020304" pitchFamily="18" charset="0"/>
-                <a:cs typeface="Times New Roman" panose="02020603050405020304" pitchFamily="18" charset="0"/>
-              </a:rPr>
-              <a:t>	</a:t>
-            </a:r>
-            <a:r>
-              <a:rPr lang="pt-BR" sz="2000" b="1" dirty="0">
-                <a:latin typeface="Times New Roman" panose="02020603050405020304" pitchFamily="18" charset="0"/>
-                <a:cs typeface="Times New Roman" panose="02020603050405020304" pitchFamily="18" charset="0"/>
-              </a:rPr>
-              <a:t>Disponível em</a:t>
-            </a:r>
-            <a:r>
-              <a:rPr lang="pt-BR" sz="2000" dirty="0">
-                <a:latin typeface="Times New Roman" panose="02020603050405020304" pitchFamily="18" charset="0"/>
-                <a:cs typeface="Times New Roman" panose="02020603050405020304" pitchFamily="18" charset="0"/>
-              </a:rPr>
-              <a:t>: </a:t>
-            </a:r>
-            <a:r>
-              <a:rPr lang="pt-BR" sz="2000" dirty="0">
+              <a:rPr lang="pt-BR" dirty="0" err="1">
+                <a:solidFill>
+                  <a:schemeClr val="tx1"/>
+                </a:solidFill>
+                <a:latin typeface="Times New Roman" panose="02020603050405020304" pitchFamily="18" charset="0"/>
+                <a:cs typeface="Times New Roman" panose="02020603050405020304" pitchFamily="18" charset="0"/>
+              </a:rPr>
+              <a:t>URLs</a:t>
+            </a:r>
+            <a:r>
+              <a:rPr lang="pt-BR" dirty="0">
+                <a:solidFill>
+                  <a:schemeClr val="tx1"/>
+                </a:solidFill>
+                <a:latin typeface="Times New Roman" panose="02020603050405020304" pitchFamily="18" charset="0"/>
+                <a:cs typeface="Times New Roman" panose="02020603050405020304" pitchFamily="18" charset="0"/>
+              </a:rPr>
+              <a:t>:</a:t>
+            </a:r>
+          </a:p>
+          <a:p>
+            <a:pPr marL="0" indent="0" algn="just">
+              <a:buNone/>
+            </a:pPr>
+            <a:r>
+              <a:rPr lang="pt-BR" dirty="0">
+                <a:solidFill>
+                  <a:schemeClr val="tx1"/>
+                </a:solidFill>
                 <a:latin typeface="Times New Roman" panose="02020603050405020304" pitchFamily="18" charset="0"/>
                 <a:cs typeface="Times New Roman" panose="02020603050405020304" pitchFamily="18" charset="0"/>
                 <a:hlinkClick r:id="rId3"/>
               </a:rPr>
-              <a:t>http://siteunidavi.s3.amazonaws.com/revistaCaminhos/ano3.pdf#page=25</a:t>
-            </a:r>
-            <a:endParaRPr lang="pt-BR" sz="2000" dirty="0">
+              <a:t>1. https://www.internetworldstats.com/stats.htm</a:t>
+            </a:r>
+            <a:endParaRPr lang="pt-BR" dirty="0">
+              <a:solidFill>
+                <a:schemeClr val="tx1"/>
+              </a:solidFill>
               <a:latin typeface="Times New Roman" panose="02020603050405020304" pitchFamily="18" charset="0"/>
               <a:cs typeface="Times New Roman" panose="02020603050405020304" pitchFamily="18" charset="0"/>
             </a:endParaRPr>
@@ -21798,7 +21843,10 @@
             <a:pPr marL="0" indent="0" algn="just">
               <a:buNone/>
             </a:pPr>
-            <a:endParaRPr lang="pt-BR" sz="2000" dirty="0">
+            <a:endParaRPr lang="pt-BR" dirty="0">
+              <a:solidFill>
+                <a:schemeClr val="tx1"/>
+              </a:solidFill>
               <a:latin typeface="Times New Roman" panose="02020603050405020304" pitchFamily="18" charset="0"/>
               <a:cs typeface="Times New Roman" panose="02020603050405020304" pitchFamily="18" charset="0"/>
             </a:endParaRPr>
@@ -21808,61 +21856,20 @@
               <a:buNone/>
             </a:pPr>
             <a:r>
-              <a:rPr lang="pt-BR" sz="2000" dirty="0">
-                <a:latin typeface="Times New Roman" panose="02020603050405020304" pitchFamily="18" charset="0"/>
-                <a:cs typeface="Times New Roman" panose="02020603050405020304" pitchFamily="18" charset="0"/>
-              </a:rPr>
-              <a:t>[2] </a:t>
-            </a:r>
-            <a:r>
-              <a:rPr lang="pt-BR" sz="2000" b="1" dirty="0">
-                <a:latin typeface="Times New Roman" panose="02020603050405020304" pitchFamily="18" charset="0"/>
-                <a:cs typeface="Times New Roman" panose="02020603050405020304" pitchFamily="18" charset="0"/>
-              </a:rPr>
-              <a:t>BATISTA</a:t>
-            </a:r>
-            <a:r>
-              <a:rPr lang="pt-BR" sz="2000" dirty="0">
-                <a:latin typeface="Times New Roman" panose="02020603050405020304" pitchFamily="18" charset="0"/>
-                <a:cs typeface="Times New Roman" panose="02020603050405020304" pitchFamily="18" charset="0"/>
-              </a:rPr>
-              <a:t>, Rafael NUNES et al. HTML5–O futuro da internet. ETIC-ENCONTRO DE INICIAÇÃO CIENTÍFICA-ISSN 21-76-8498, v. 7, n. 7, 2011.</a:t>
-            </a:r>
-          </a:p>
-          <a:p>
-            <a:pPr marL="0" indent="0" algn="just">
-              <a:buNone/>
-            </a:pPr>
-            <a:r>
-              <a:rPr lang="pt-BR" sz="2000" dirty="0">
-                <a:latin typeface="Times New Roman" panose="02020603050405020304" pitchFamily="18" charset="0"/>
-                <a:cs typeface="Times New Roman" panose="02020603050405020304" pitchFamily="18" charset="0"/>
-              </a:rPr>
-              <a:t>	</a:t>
-            </a:r>
-            <a:r>
-              <a:rPr lang="pt-BR" sz="2000" b="1" dirty="0">
-                <a:latin typeface="Times New Roman" panose="02020603050405020304" pitchFamily="18" charset="0"/>
-                <a:cs typeface="Times New Roman" panose="02020603050405020304" pitchFamily="18" charset="0"/>
-              </a:rPr>
-              <a:t>Disponível em</a:t>
-            </a:r>
-            <a:r>
-              <a:rPr lang="pt-BR" sz="2000" dirty="0">
-                <a:latin typeface="Times New Roman" panose="02020603050405020304" pitchFamily="18" charset="0"/>
-                <a:cs typeface="Times New Roman" panose="02020603050405020304" pitchFamily="18" charset="0"/>
-              </a:rPr>
-              <a:t>: </a:t>
-            </a:r>
-            <a:r>
-              <a:rPr lang="pt-BR" sz="2000" dirty="0">
+              <a:rPr lang="pt-BR" dirty="0">
+                <a:solidFill>
+                  <a:schemeClr val="tx1"/>
+                </a:solidFill>
                 <a:latin typeface="Times New Roman" panose="02020603050405020304" pitchFamily="18" charset="0"/>
                 <a:cs typeface="Times New Roman" panose="02020603050405020304" pitchFamily="18" charset="0"/>
                 <a:hlinkClick r:id="rId4"/>
               </a:rPr>
-              <a:t>http://intertemas.toledoprudente.edu.br/index.php/ETIC/article/view/3960</a:t>
-            </a:r>
-            <a:endParaRPr lang="pt-BR" sz="2000" dirty="0">
+              <a:t>2. https://gs.statcounter.com/</a:t>
+            </a:r>
+            <a:endParaRPr lang="pt-BR" dirty="0">
+              <a:solidFill>
+                <a:schemeClr val="tx1"/>
+              </a:solidFill>
               <a:latin typeface="Times New Roman" panose="02020603050405020304" pitchFamily="18" charset="0"/>
               <a:cs typeface="Times New Roman" panose="02020603050405020304" pitchFamily="18" charset="0"/>
             </a:endParaRPr>
@@ -21871,7 +21878,126 @@
             <a:pPr marL="0" indent="0" algn="just">
               <a:buNone/>
             </a:pPr>
-            <a:endParaRPr lang="pt-BR" sz="2000" dirty="0">
+            <a:endParaRPr lang="pt-BR" dirty="0">
+              <a:solidFill>
+                <a:schemeClr val="tx1"/>
+              </a:solidFill>
+              <a:latin typeface="Times New Roman" panose="02020603050405020304" pitchFamily="18" charset="0"/>
+              <a:cs typeface="Times New Roman" panose="02020603050405020304" pitchFamily="18" charset="0"/>
+            </a:endParaRPr>
+          </a:p>
+          <a:p>
+            <a:pPr marL="0" indent="0" algn="just">
+              <a:buNone/>
+            </a:pPr>
+            <a:r>
+              <a:rPr lang="pt-BR" dirty="0">
+                <a:solidFill>
+                  <a:schemeClr val="tx1"/>
+                </a:solidFill>
+                <a:latin typeface="Times New Roman" panose="02020603050405020304" pitchFamily="18" charset="0"/>
+                <a:cs typeface="Times New Roman" panose="02020603050405020304" pitchFamily="18" charset="0"/>
+                <a:hlinkClick r:id="rId5"/>
+              </a:rPr>
+              <a:t>3. https://canaltech.com.br/navegadores/</a:t>
+            </a:r>
+            <a:endParaRPr lang="pt-BR" dirty="0">
+              <a:solidFill>
+                <a:schemeClr val="tx1"/>
+              </a:solidFill>
+              <a:latin typeface="Times New Roman" panose="02020603050405020304" pitchFamily="18" charset="0"/>
+              <a:cs typeface="Times New Roman" panose="02020603050405020304" pitchFamily="18" charset="0"/>
+            </a:endParaRPr>
+          </a:p>
+          <a:p>
+            <a:pPr marL="0" indent="0" algn="just">
+              <a:buNone/>
+            </a:pPr>
+            <a:endParaRPr lang="pt-BR" dirty="0">
+              <a:solidFill>
+                <a:schemeClr val="tx1"/>
+              </a:solidFill>
+              <a:latin typeface="Times New Roman" panose="02020603050405020304" pitchFamily="18" charset="0"/>
+              <a:cs typeface="Times New Roman" panose="02020603050405020304" pitchFamily="18" charset="0"/>
+            </a:endParaRPr>
+          </a:p>
+          <a:p>
+            <a:pPr marL="0" indent="0" algn="just">
+              <a:buNone/>
+            </a:pPr>
+            <a:r>
+              <a:rPr lang="pt-BR" dirty="0">
+                <a:solidFill>
+                  <a:schemeClr val="tx1"/>
+                </a:solidFill>
+                <a:latin typeface="Times New Roman" panose="02020603050405020304" pitchFamily="18" charset="0"/>
+                <a:cs typeface="Times New Roman" panose="02020603050405020304" pitchFamily="18" charset="0"/>
+              </a:rPr>
+              <a:t>4. </a:t>
+            </a:r>
+            <a:r>
+              <a:rPr lang="pt-BR" dirty="0">
+                <a:solidFill>
+                  <a:schemeClr val="tx1"/>
+                </a:solidFill>
+                <a:latin typeface="Times New Roman" panose="02020603050405020304" pitchFamily="18" charset="0"/>
+                <a:cs typeface="Times New Roman" panose="02020603050405020304" pitchFamily="18" charset="0"/>
+                <a:hlinkClick r:id="rId6"/>
+              </a:rPr>
+              <a:t>https://www.tecmundo.com.br/</a:t>
+            </a:r>
+            <a:endParaRPr lang="pt-BR" dirty="0">
+              <a:solidFill>
+                <a:schemeClr val="tx1"/>
+              </a:solidFill>
+              <a:latin typeface="Times New Roman" panose="02020603050405020304" pitchFamily="18" charset="0"/>
+              <a:cs typeface="Times New Roman" panose="02020603050405020304" pitchFamily="18" charset="0"/>
+            </a:endParaRPr>
+          </a:p>
+          <a:p>
+            <a:pPr marL="0" indent="0" algn="just">
+              <a:buNone/>
+            </a:pPr>
+            <a:endParaRPr lang="pt-BR" dirty="0">
+              <a:solidFill>
+                <a:schemeClr val="tx1"/>
+              </a:solidFill>
+              <a:latin typeface="Times New Roman" panose="02020603050405020304" pitchFamily="18" charset="0"/>
+              <a:cs typeface="Times New Roman" panose="02020603050405020304" pitchFamily="18" charset="0"/>
+            </a:endParaRPr>
+          </a:p>
+          <a:p>
+            <a:pPr marL="0" indent="0" algn="just">
+              <a:buNone/>
+            </a:pPr>
+            <a:endParaRPr lang="pt-BR" dirty="0">
+              <a:solidFill>
+                <a:schemeClr val="tx1"/>
+              </a:solidFill>
+              <a:latin typeface="Times New Roman" panose="02020603050405020304" pitchFamily="18" charset="0"/>
+              <a:cs typeface="Times New Roman" panose="02020603050405020304" pitchFamily="18" charset="0"/>
+            </a:endParaRPr>
+          </a:p>
+          <a:p>
+            <a:pPr marL="0" indent="0" algn="just">
+              <a:buNone/>
+            </a:pPr>
+            <a:endParaRPr lang="pt-BR" dirty="0">
+              <a:solidFill>
+                <a:schemeClr val="tx1"/>
+              </a:solidFill>
+              <a:latin typeface="Times New Roman" panose="02020603050405020304" pitchFamily="18" charset="0"/>
+              <a:cs typeface="Times New Roman" panose="02020603050405020304" pitchFamily="18" charset="0"/>
+            </a:endParaRPr>
+          </a:p>
+          <a:p>
+            <a:pPr marL="0" indent="0" algn="just">
+              <a:buNone/>
+            </a:pPr>
+            <a:endParaRPr lang="pt-BR" dirty="0">
+              <a:solidFill>
+                <a:schemeClr val="tx1"/>
+              </a:solidFill>
               <a:latin typeface="Times New Roman" panose="02020603050405020304" pitchFamily="18" charset="0"/>
               <a:cs typeface="Times New Roman" panose="02020603050405020304" pitchFamily="18" charset="0"/>
             </a:endParaRPr>
@@ -21881,7 +22007,7 @@
     </p:spTree>
     <p:extLst>
       <p:ext uri="{BB962C8B-B14F-4D97-AF65-F5344CB8AC3E}">
-        <p14:creationId xmlns:p14="http://schemas.microsoft.com/office/powerpoint/2010/main" val="3680270425"/>
+        <p14:creationId xmlns:p14="http://schemas.microsoft.com/office/powerpoint/2010/main" val="4204514671"/>
       </p:ext>
     </p:extLst>
   </p:cSld>
@@ -21937,7 +22063,7 @@
                   <a:srgbClr val="0070C0"/>
                 </a:solidFill>
               </a:rPr>
-              <a:t>Aprenda</a:t>
+              <a:t>Leitura</a:t>
             </a:r>
             <a:r>
               <a:rPr lang="en-US" b="1" dirty="0">
@@ -21945,8 +22071,21 @@
                   <a:srgbClr val="0070C0"/>
                 </a:solidFill>
               </a:rPr>
-              <a:t>+</a:t>
-            </a:r>
+              <a:t> </a:t>
+            </a:r>
+            <a:r>
+              <a:rPr lang="en-US" b="1" dirty="0" err="1">
+                <a:solidFill>
+                  <a:srgbClr val="0070C0"/>
+                </a:solidFill>
+              </a:rPr>
+              <a:t>Específica</a:t>
+            </a:r>
+            <a:endParaRPr lang="en-US" b="1" dirty="0">
+              <a:solidFill>
+                <a:srgbClr val="0070C0"/>
+              </a:solidFill>
+            </a:endParaRPr>
           </a:p>
         </p:txBody>
       </p:sp>
@@ -21962,7 +22101,7 @@
         </p:nvSpPr>
         <p:spPr>
           <a:xfrm>
-            <a:off x="142865" y="1200151"/>
+            <a:off x="142865" y="1012261"/>
             <a:ext cx="8865056" cy="3394472"/>
           </a:xfrm>
         </p:spPr>
@@ -21975,7 +22114,76 @@
             <a:pPr marL="0" indent="0" algn="just">
               <a:buNone/>
             </a:pPr>
-            <a:endParaRPr lang="pt-BR" sz="2400" dirty="0">
+            <a:r>
+              <a:rPr lang="pt-BR" sz="2000" dirty="0">
+                <a:latin typeface="Times New Roman" panose="02020603050405020304" pitchFamily="18" charset="0"/>
+                <a:cs typeface="Times New Roman" panose="02020603050405020304" pitchFamily="18" charset="0"/>
+              </a:rPr>
+              <a:t>[1] </a:t>
+            </a:r>
+            <a:r>
+              <a:rPr lang="pt-BR" sz="2000" b="1" dirty="0">
+                <a:latin typeface="Times New Roman" panose="02020603050405020304" pitchFamily="18" charset="0"/>
+                <a:cs typeface="Times New Roman" panose="02020603050405020304" pitchFamily="18" charset="0"/>
+              </a:rPr>
+              <a:t>IKENO</a:t>
+            </a:r>
+            <a:r>
+              <a:rPr lang="pt-BR" sz="2000" dirty="0">
+                <a:latin typeface="Times New Roman" panose="02020603050405020304" pitchFamily="18" charset="0"/>
+                <a:cs typeface="Times New Roman" panose="02020603050405020304" pitchFamily="18" charset="0"/>
+              </a:rPr>
+              <a:t>, Sergio N.; DA COSTA MARCHI¹, </a:t>
+            </a:r>
+            <a:r>
+              <a:rPr lang="pt-BR" sz="2000" dirty="0" err="1">
+                <a:latin typeface="Times New Roman" panose="02020603050405020304" pitchFamily="18" charset="0"/>
+                <a:cs typeface="Times New Roman" panose="02020603050405020304" pitchFamily="18" charset="0"/>
+              </a:rPr>
+              <a:t>Késsia</a:t>
+            </a:r>
+            <a:r>
+              <a:rPr lang="pt-BR" sz="2000" dirty="0">
+                <a:latin typeface="Times New Roman" panose="02020603050405020304" pitchFamily="18" charset="0"/>
+                <a:cs typeface="Times New Roman" panose="02020603050405020304" pitchFamily="18" charset="0"/>
+              </a:rPr>
+              <a:t> Rita. Análise da Nova Linguagem HTML5 para o Desenvolvimento Web.</a:t>
+            </a:r>
+          </a:p>
+          <a:p>
+            <a:pPr marL="0" indent="0" algn="just">
+              <a:buNone/>
+            </a:pPr>
+            <a:r>
+              <a:rPr lang="pt-BR" sz="2000" dirty="0">
+                <a:latin typeface="Times New Roman" panose="02020603050405020304" pitchFamily="18" charset="0"/>
+                <a:cs typeface="Times New Roman" panose="02020603050405020304" pitchFamily="18" charset="0"/>
+              </a:rPr>
+              <a:t>	</a:t>
+            </a:r>
+            <a:r>
+              <a:rPr lang="pt-BR" sz="2000" b="1" dirty="0">
+                <a:latin typeface="Times New Roman" panose="02020603050405020304" pitchFamily="18" charset="0"/>
+                <a:cs typeface="Times New Roman" panose="02020603050405020304" pitchFamily="18" charset="0"/>
+              </a:rPr>
+              <a:t>Disponível em</a:t>
+            </a:r>
+            <a:r>
+              <a:rPr lang="pt-BR" sz="2000" dirty="0">
+                <a:latin typeface="Times New Roman" panose="02020603050405020304" pitchFamily="18" charset="0"/>
+                <a:cs typeface="Times New Roman" panose="02020603050405020304" pitchFamily="18" charset="0"/>
+              </a:rPr>
+              <a:t>: </a:t>
+            </a:r>
+            <a:r>
+              <a:rPr lang="pt-BR" sz="2000" dirty="0">
+                <a:latin typeface="Times New Roman" panose="02020603050405020304" pitchFamily="18" charset="0"/>
+                <a:cs typeface="Times New Roman" panose="02020603050405020304" pitchFamily="18" charset="0"/>
+                <a:hlinkClick r:id="rId3"/>
+              </a:rPr>
+              <a:t>http://siteunidavi.s3.amazonaws.com/revistaCaminhos/ano3.pdf#page=25</a:t>
+            </a:r>
+            <a:endParaRPr lang="pt-BR" sz="2000" dirty="0">
               <a:latin typeface="Times New Roman" panose="02020603050405020304" pitchFamily="18" charset="0"/>
               <a:cs typeface="Times New Roman" panose="02020603050405020304" pitchFamily="18" charset="0"/>
             </a:endParaRPr>
@@ -21984,34 +22192,7 @@
             <a:pPr marL="0" indent="0" algn="just">
               <a:buNone/>
             </a:pPr>
-            <a:r>
-              <a:rPr lang="pt-BR" sz="2400" dirty="0">
-                <a:latin typeface="Times New Roman" panose="02020603050405020304" pitchFamily="18" charset="0"/>
-                <a:cs typeface="Times New Roman" panose="02020603050405020304" pitchFamily="18" charset="0"/>
-              </a:rPr>
-              <a:t>[1] </a:t>
-            </a:r>
-            <a:r>
-              <a:rPr lang="pt-BR" sz="2400" dirty="0">
-                <a:latin typeface="Times New Roman" panose="02020603050405020304" pitchFamily="18" charset="0"/>
-                <a:cs typeface="Times New Roman" panose="02020603050405020304" pitchFamily="18" charset="0"/>
-                <a:hlinkClick r:id="rId3"/>
-              </a:rPr>
-              <a:t>https://www.youtube.com/watch?v=hu-q2zYwEYs</a:t>
-            </a:r>
-            <a:r>
-              <a:rPr lang="pt-BR" sz="2400" dirty="0">
-                <a:latin typeface="Times New Roman" panose="02020603050405020304" pitchFamily="18" charset="0"/>
-                <a:cs typeface="Times New Roman" panose="02020603050405020304" pitchFamily="18" charset="0"/>
-              </a:rPr>
-              <a:t> (HTML)</a:t>
-            </a:r>
-          </a:p>
-          <a:p>
-            <a:pPr marL="0" indent="0" algn="just">
-              <a:buNone/>
-            </a:pPr>
-            <a:endParaRPr lang="pt-BR" sz="2400" dirty="0">
+            <a:endParaRPr lang="pt-BR" sz="2000" dirty="0">
               <a:latin typeface="Times New Roman" panose="02020603050405020304" pitchFamily="18" charset="0"/>
               <a:cs typeface="Times New Roman" panose="02020603050405020304" pitchFamily="18" charset="0"/>
             </a:endParaRPr>
@@ -22020,7 +22201,62 @@
             <a:pPr marL="0" indent="0" algn="just">
               <a:buNone/>
             </a:pPr>
-            <a:endParaRPr lang="pt-BR" sz="2400" dirty="0">
+            <a:r>
+              <a:rPr lang="pt-BR" sz="2000" dirty="0">
+                <a:latin typeface="Times New Roman" panose="02020603050405020304" pitchFamily="18" charset="0"/>
+                <a:cs typeface="Times New Roman" panose="02020603050405020304" pitchFamily="18" charset="0"/>
+              </a:rPr>
+              <a:t>[2] </a:t>
+            </a:r>
+            <a:r>
+              <a:rPr lang="pt-BR" sz="2000" b="1" dirty="0">
+                <a:latin typeface="Times New Roman" panose="02020603050405020304" pitchFamily="18" charset="0"/>
+                <a:cs typeface="Times New Roman" panose="02020603050405020304" pitchFamily="18" charset="0"/>
+              </a:rPr>
+              <a:t>BATISTA</a:t>
+            </a:r>
+            <a:r>
+              <a:rPr lang="pt-BR" sz="2000" dirty="0">
+                <a:latin typeface="Times New Roman" panose="02020603050405020304" pitchFamily="18" charset="0"/>
+                <a:cs typeface="Times New Roman" panose="02020603050405020304" pitchFamily="18" charset="0"/>
+              </a:rPr>
+              <a:t>, Rafael NUNES et al. HTML5–O futuro da internet. ETIC-ENCONTRO DE INICIAÇÃO CIENTÍFICA-ISSN 21-76-8498, v. 7, n. 7, 2011.</a:t>
+            </a:r>
+          </a:p>
+          <a:p>
+            <a:pPr marL="0" indent="0" algn="just">
+              <a:buNone/>
+            </a:pPr>
+            <a:r>
+              <a:rPr lang="pt-BR" sz="2000" dirty="0">
+                <a:latin typeface="Times New Roman" panose="02020603050405020304" pitchFamily="18" charset="0"/>
+                <a:cs typeface="Times New Roman" panose="02020603050405020304" pitchFamily="18" charset="0"/>
+              </a:rPr>
+              <a:t>	</a:t>
+            </a:r>
+            <a:r>
+              <a:rPr lang="pt-BR" sz="2000" b="1" dirty="0">
+                <a:latin typeface="Times New Roman" panose="02020603050405020304" pitchFamily="18" charset="0"/>
+                <a:cs typeface="Times New Roman" panose="02020603050405020304" pitchFamily="18" charset="0"/>
+              </a:rPr>
+              <a:t>Disponível em</a:t>
+            </a:r>
+            <a:r>
+              <a:rPr lang="pt-BR" sz="2000" dirty="0">
+                <a:latin typeface="Times New Roman" panose="02020603050405020304" pitchFamily="18" charset="0"/>
+                <a:cs typeface="Times New Roman" panose="02020603050405020304" pitchFamily="18" charset="0"/>
+              </a:rPr>
+              <a:t>: </a:t>
+            </a:r>
+            <a:r>
+              <a:rPr lang="pt-BR" sz="2000" dirty="0">
+                <a:latin typeface="Times New Roman" panose="02020603050405020304" pitchFamily="18" charset="0"/>
+                <a:cs typeface="Times New Roman" panose="02020603050405020304" pitchFamily="18" charset="0"/>
+                <a:hlinkClick r:id="rId4"/>
+              </a:rPr>
+              <a:t>http://intertemas.toledoprudente.edu.br/index.php/ETIC/article/view/3960</a:t>
+            </a:r>
+            <a:endParaRPr lang="pt-BR" sz="2000" dirty="0">
               <a:latin typeface="Times New Roman" panose="02020603050405020304" pitchFamily="18" charset="0"/>
               <a:cs typeface="Times New Roman" panose="02020603050405020304" pitchFamily="18" charset="0"/>
             </a:endParaRPr>
@@ -22029,31 +22265,7 @@
             <a:pPr marL="0" indent="0" algn="just">
               <a:buNone/>
             </a:pPr>
-            <a:r>
-              <a:rPr lang="pt-BR" sz="2400" dirty="0">
-                <a:latin typeface="Times New Roman" panose="02020603050405020304" pitchFamily="18" charset="0"/>
-                <a:cs typeface="Times New Roman" panose="02020603050405020304" pitchFamily="18" charset="0"/>
-              </a:rPr>
-              <a:t>[2]  </a:t>
-            </a:r>
-            <a:r>
-              <a:rPr lang="pt-BR" sz="2400" dirty="0">
-                <a:latin typeface="Times New Roman" panose="02020603050405020304" pitchFamily="18" charset="0"/>
-                <a:cs typeface="Times New Roman" panose="02020603050405020304" pitchFamily="18" charset="0"/>
-                <a:hlinkClick r:id="rId4"/>
-              </a:rPr>
-              <a:t>https://www.youtube.com/watch?v=UB1O30fR-EE</a:t>
-            </a:r>
-            <a:endParaRPr lang="pt-BR" sz="2400" dirty="0">
-              <a:latin typeface="Times New Roman" panose="02020603050405020304" pitchFamily="18" charset="0"/>
-              <a:cs typeface="Times New Roman" panose="02020603050405020304" pitchFamily="18" charset="0"/>
-            </a:endParaRPr>
-          </a:p>
-          <a:p>
-            <a:pPr marL="0" indent="0" algn="just">
-              <a:buNone/>
-            </a:pPr>
-            <a:endParaRPr lang="pt-BR" sz="2400" dirty="0">
+            <a:endParaRPr lang="pt-BR" sz="2000" dirty="0">
               <a:latin typeface="Times New Roman" panose="02020603050405020304" pitchFamily="18" charset="0"/>
               <a:cs typeface="Times New Roman" panose="02020603050405020304" pitchFamily="18" charset="0"/>
             </a:endParaRPr>
@@ -22063,7 +22275,7 @@
     </p:spTree>
     <p:extLst>
       <p:ext uri="{BB962C8B-B14F-4D97-AF65-F5344CB8AC3E}">
-        <p14:creationId xmlns:p14="http://schemas.microsoft.com/office/powerpoint/2010/main" val="2747596967"/>
+        <p14:creationId xmlns:p14="http://schemas.microsoft.com/office/powerpoint/2010/main" val="3680270425"/>
       </p:ext>
     </p:extLst>
   </p:cSld>
@@ -22119,7 +22331,7 @@
                   <a:srgbClr val="0070C0"/>
                 </a:solidFill>
               </a:rPr>
-              <a:t>Dinâmica</a:t>
+              <a:t>Aprenda</a:t>
             </a:r>
             <a:r>
               <a:rPr lang="en-US" b="1" dirty="0">
@@ -22127,21 +22339,8 @@
                   <a:srgbClr val="0070C0"/>
                 </a:solidFill>
               </a:rPr>
-              <a:t>/</a:t>
-            </a:r>
-            <a:r>
-              <a:rPr lang="en-US" b="1" dirty="0" err="1">
-                <a:solidFill>
-                  <a:srgbClr val="0070C0"/>
-                </a:solidFill>
-              </a:rPr>
-              <a:t>Atividades</a:t>
-            </a:r>
-            <a:endParaRPr lang="en-US" b="1" dirty="0">
-              <a:solidFill>
-                <a:srgbClr val="0070C0"/>
-              </a:solidFill>
-            </a:endParaRPr>
+              <a:t>+</a:t>
+            </a:r>
           </a:p>
         </p:txBody>
       </p:sp>
@@ -22157,8 +22356,8 @@
         </p:nvSpPr>
         <p:spPr>
           <a:xfrm>
-            <a:off x="139472" y="1063230"/>
-            <a:ext cx="8865056" cy="3606305"/>
+            <a:off x="142865" y="1200151"/>
+            <a:ext cx="8865056" cy="3394472"/>
           </a:xfrm>
         </p:spPr>
         <p:txBody>
@@ -22167,91 +22366,10 @@
           </a:bodyPr>
           <a:lstStyle/>
           <a:p>
-            <a:pPr algn="just">
-              <a:buFontTx/>
-              <a:buChar char="-"/>
-            </a:pPr>
-            <a:r>
-              <a:rPr lang="pt-BR" dirty="0">
-                <a:latin typeface="Times New Roman" panose="02020603050405020304" pitchFamily="18" charset="0"/>
-                <a:cs typeface="Times New Roman" panose="02020603050405020304" pitchFamily="18" charset="0"/>
-              </a:rPr>
-              <a:t>Exercícios de Fixação </a:t>
-            </a:r>
-            <a:r>
-              <a:rPr lang="pt-BR" b="1" dirty="0">
-                <a:latin typeface="Times New Roman" panose="02020603050405020304" pitchFamily="18" charset="0"/>
-                <a:cs typeface="Times New Roman" panose="02020603050405020304" pitchFamily="18" charset="0"/>
-              </a:rPr>
-              <a:t>HTML</a:t>
-            </a:r>
-          </a:p>
-          <a:p>
-            <a:pPr marL="0" indent="0" algn="just">
-              <a:buNone/>
-            </a:pPr>
-            <a:r>
-              <a:rPr lang="pt-BR" dirty="0">
-                <a:latin typeface="Times New Roman" panose="02020603050405020304" pitchFamily="18" charset="0"/>
-                <a:cs typeface="Times New Roman" panose="02020603050405020304" pitchFamily="18" charset="0"/>
-              </a:rPr>
-              <a:t>	</a:t>
-            </a:r>
-            <a:r>
-              <a:rPr lang="pt-BR" b="1" dirty="0">
-                <a:solidFill>
-                  <a:srgbClr val="FF0000"/>
-                </a:solidFill>
-                <a:latin typeface="Times New Roman" panose="02020603050405020304" pitchFamily="18" charset="0"/>
-                <a:cs typeface="Times New Roman" panose="02020603050405020304" pitchFamily="18" charset="0"/>
-              </a:rPr>
-              <a:t>Desafios em Sala de Aula</a:t>
-            </a:r>
-            <a:r>
-              <a:rPr lang="pt-BR" dirty="0">
-                <a:latin typeface="Times New Roman" panose="02020603050405020304" pitchFamily="18" charset="0"/>
-                <a:cs typeface="Times New Roman" panose="02020603050405020304" pitchFamily="18" charset="0"/>
-              </a:rPr>
-              <a:t>.</a:t>
-            </a:r>
-          </a:p>
-          <a:p>
-            <a:pPr marL="0" indent="0" algn="just">
-              <a:buNone/>
-            </a:pPr>
-            <a:r>
-              <a:rPr lang="pt-BR" dirty="0">
-                <a:latin typeface="Times New Roman" panose="02020603050405020304" pitchFamily="18" charset="0"/>
-                <a:cs typeface="Times New Roman" panose="02020603050405020304" pitchFamily="18" charset="0"/>
-              </a:rPr>
-              <a:t>	</a:t>
-            </a:r>
-          </a:p>
-          <a:p>
-            <a:pPr marL="0" indent="0" algn="just">
-              <a:buNone/>
-            </a:pPr>
-            <a:r>
-              <a:rPr lang="es-ES" dirty="0">
-                <a:latin typeface="Times New Roman" panose="02020603050405020304" pitchFamily="18" charset="0"/>
-                <a:cs typeface="Times New Roman" panose="02020603050405020304" pitchFamily="18" charset="0"/>
-              </a:rPr>
-              <a:t>- Quiz HTML</a:t>
-            </a:r>
-          </a:p>
-          <a:p>
-            <a:pPr marL="0" indent="0" algn="just">
-              <a:buNone/>
-            </a:pPr>
-            <a:r>
-              <a:rPr lang="es-ES" dirty="0">
-                <a:latin typeface="Times New Roman" panose="02020603050405020304" pitchFamily="18" charset="0"/>
-                <a:cs typeface="Times New Roman" panose="02020603050405020304" pitchFamily="18" charset="0"/>
-                <a:hlinkClick r:id="rId3"/>
-              </a:rPr>
-              <a:t>https://docs.google.com/forms/d/1sIof5xEJ_sP-fUk_qgOKjhtV25D_a438OowjG30xL1o/prefill</a:t>
-            </a:r>
-            <a:endParaRPr lang="es-ES" dirty="0">
+            <a:pPr marL="0" indent="0" algn="just">
+              <a:buNone/>
+            </a:pPr>
+            <a:endParaRPr lang="pt-BR" sz="2400" dirty="0">
               <a:latin typeface="Times New Roman" panose="02020603050405020304" pitchFamily="18" charset="0"/>
               <a:cs typeface="Times New Roman" panose="02020603050405020304" pitchFamily="18" charset="0"/>
             </a:endParaRPr>
@@ -22260,7 +22378,34 @@
             <a:pPr marL="0" indent="0" algn="just">
               <a:buNone/>
             </a:pPr>
-            <a:endParaRPr lang="es-ES" dirty="0">
+            <a:r>
+              <a:rPr lang="pt-BR" sz="2400" dirty="0">
+                <a:latin typeface="Times New Roman" panose="02020603050405020304" pitchFamily="18" charset="0"/>
+                <a:cs typeface="Times New Roman" panose="02020603050405020304" pitchFamily="18" charset="0"/>
+              </a:rPr>
+              <a:t>[1] </a:t>
+            </a:r>
+            <a:r>
+              <a:rPr lang="pt-BR" sz="2400" dirty="0">
+                <a:latin typeface="Times New Roman" panose="02020603050405020304" pitchFamily="18" charset="0"/>
+                <a:cs typeface="Times New Roman" panose="02020603050405020304" pitchFamily="18" charset="0"/>
+                <a:hlinkClick r:id="rId3"/>
+              </a:rPr>
+              <a:t>https://www.youtube.com/watch?v=hu-q2zYwEYs</a:t>
+            </a:r>
+            <a:r>
+              <a:rPr lang="pt-BR" sz="2400" dirty="0">
+                <a:latin typeface="Times New Roman" panose="02020603050405020304" pitchFamily="18" charset="0"/>
+                <a:cs typeface="Times New Roman" panose="02020603050405020304" pitchFamily="18" charset="0"/>
+              </a:rPr>
+              <a:t> (HTML)</a:t>
+            </a:r>
+          </a:p>
+          <a:p>
+            <a:pPr marL="0" indent="0" algn="just">
+              <a:buNone/>
+            </a:pPr>
+            <a:endParaRPr lang="pt-BR" sz="2400" dirty="0">
               <a:latin typeface="Times New Roman" panose="02020603050405020304" pitchFamily="18" charset="0"/>
               <a:cs typeface="Times New Roman" panose="02020603050405020304" pitchFamily="18" charset="0"/>
             </a:endParaRPr>
@@ -22269,22 +22414,42 @@
             <a:pPr marL="0" indent="0" algn="just">
               <a:buNone/>
             </a:pPr>
-            <a:endParaRPr lang="pt-BR" dirty="0">
+            <a:endParaRPr lang="pt-BR" sz="2400" dirty="0">
               <a:latin typeface="Times New Roman" panose="02020603050405020304" pitchFamily="18" charset="0"/>
               <a:cs typeface="Times New Roman" panose="02020603050405020304" pitchFamily="18" charset="0"/>
             </a:endParaRPr>
           </a:p>
           <a:p>
-            <a:pPr algn="just"/>
-            <a:endParaRPr lang="pt-BR" dirty="0">
+            <a:pPr marL="0" indent="0" algn="just">
+              <a:buNone/>
+            </a:pPr>
+            <a:r>
+              <a:rPr lang="pt-BR" sz="2400" dirty="0">
+                <a:latin typeface="Times New Roman" panose="02020603050405020304" pitchFamily="18" charset="0"/>
+                <a:cs typeface="Times New Roman" panose="02020603050405020304" pitchFamily="18" charset="0"/>
+              </a:rPr>
+              <a:t>[2]  </a:t>
+            </a:r>
+            <a:r>
+              <a:rPr lang="pt-BR" sz="2400" dirty="0">
+                <a:latin typeface="Times New Roman" panose="02020603050405020304" pitchFamily="18" charset="0"/>
+                <a:cs typeface="Times New Roman" panose="02020603050405020304" pitchFamily="18" charset="0"/>
+                <a:hlinkClick r:id="rId4"/>
+              </a:rPr>
+              <a:t>https://www.youtube.com/watch?v=UB1O30fR-EE</a:t>
+            </a:r>
+            <a:endParaRPr lang="pt-BR" sz="2400" dirty="0">
               <a:latin typeface="Times New Roman" panose="02020603050405020304" pitchFamily="18" charset="0"/>
               <a:cs typeface="Times New Roman" panose="02020603050405020304" pitchFamily="18" charset="0"/>
             </a:endParaRPr>
           </a:p>
           <a:p>
-            <a:pPr algn="just"/>
-            <a:endParaRPr lang="pt-BR" dirty="0">
-              <a:latin typeface="Calibri" panose="020F0502020204030204" pitchFamily="34" charset="0"/>
+            <a:pPr marL="0" indent="0" algn="just">
+              <a:buNone/>
+            </a:pPr>
+            <a:endParaRPr lang="pt-BR" sz="2400" dirty="0">
+              <a:latin typeface="Times New Roman" panose="02020603050405020304" pitchFamily="18" charset="0"/>
+              <a:cs typeface="Times New Roman" panose="02020603050405020304" pitchFamily="18" charset="0"/>
             </a:endParaRPr>
           </a:p>
         </p:txBody>
@@ -22292,7 +22457,7 @@
     </p:spTree>
     <p:extLst>
       <p:ext uri="{BB962C8B-B14F-4D97-AF65-F5344CB8AC3E}">
-        <p14:creationId xmlns:p14="http://schemas.microsoft.com/office/powerpoint/2010/main" val="2470652989"/>
+        <p14:creationId xmlns:p14="http://schemas.microsoft.com/office/powerpoint/2010/main" val="2747596967"/>
       </p:ext>
     </p:extLst>
   </p:cSld>
@@ -22348,7 +22513,7 @@
                   <a:srgbClr val="0070C0"/>
                 </a:solidFill>
               </a:rPr>
-              <a:t>Referências</a:t>
+              <a:t>Dinâmica</a:t>
             </a:r>
             <a:r>
               <a:rPr lang="en-US" b="1" dirty="0">
@@ -22356,7 +22521,7 @@
                   <a:srgbClr val="0070C0"/>
                 </a:solidFill>
               </a:rPr>
-              <a:t> </a:t>
+              <a:t>/</a:t>
             </a:r>
             <a:r>
               <a:rPr lang="en-US" b="1" dirty="0" err="1">
@@ -22364,7 +22529,7 @@
                   <a:srgbClr val="0070C0"/>
                 </a:solidFill>
               </a:rPr>
-              <a:t>Bibliográficas</a:t>
+              <a:t>Atividades</a:t>
             </a:r>
             <a:endParaRPr lang="en-US" b="1" dirty="0">
               <a:solidFill>
@@ -22386,8 +22551,8 @@
         </p:nvSpPr>
         <p:spPr>
           <a:xfrm>
-            <a:off x="142865" y="1200151"/>
-            <a:ext cx="8865056" cy="3394472"/>
+            <a:off x="139472" y="1063230"/>
+            <a:ext cx="8865056" cy="3606305"/>
           </a:xfrm>
         </p:spPr>
         <p:txBody>
@@ -22396,50 +22561,91 @@
           </a:bodyPr>
           <a:lstStyle/>
           <a:p>
-            <a:pPr marL="0" indent="0" algn="just">
-              <a:buNone/>
-            </a:pPr>
-            <a:r>
-              <a:rPr lang="pt-BR" sz="2400" dirty="0">
-                <a:latin typeface="Times New Roman" panose="02020603050405020304" pitchFamily="18" charset="0"/>
-                <a:cs typeface="Times New Roman" panose="02020603050405020304" pitchFamily="18" charset="0"/>
-              </a:rPr>
-              <a:t>[1] </a:t>
-            </a:r>
-            <a:r>
-              <a:rPr lang="pt-BR" sz="2400" b="1" dirty="0">
-                <a:latin typeface="Times New Roman" panose="02020603050405020304" pitchFamily="18" charset="0"/>
-                <a:cs typeface="Times New Roman" panose="02020603050405020304" pitchFamily="18" charset="0"/>
-              </a:rPr>
-              <a:t>SILVA</a:t>
-            </a:r>
-            <a:r>
-              <a:rPr lang="pt-BR" sz="2400" dirty="0">
-                <a:latin typeface="Times New Roman" panose="02020603050405020304" pitchFamily="18" charset="0"/>
-                <a:cs typeface="Times New Roman" panose="02020603050405020304" pitchFamily="18" charset="0"/>
-              </a:rPr>
-              <a:t>, Mauricio Samy. HTML5: a linguagem de marcação que revolucionou a web. </a:t>
-            </a:r>
-            <a:r>
-              <a:rPr lang="pt-BR" sz="2400" dirty="0" err="1">
-                <a:latin typeface="Times New Roman" panose="02020603050405020304" pitchFamily="18" charset="0"/>
-                <a:cs typeface="Times New Roman" panose="02020603050405020304" pitchFamily="18" charset="0"/>
-              </a:rPr>
-              <a:t>Novatec</a:t>
-            </a:r>
-            <a:r>
-              <a:rPr lang="pt-BR" sz="2400" dirty="0">
-                <a:latin typeface="Times New Roman" panose="02020603050405020304" pitchFamily="18" charset="0"/>
-                <a:cs typeface="Times New Roman" panose="02020603050405020304" pitchFamily="18" charset="0"/>
-              </a:rPr>
-              <a:t> Editora, 2019.</a:t>
-            </a:r>
-          </a:p>
-          <a:p>
-            <a:pPr marL="0" indent="0" algn="just">
-              <a:buNone/>
-            </a:pPr>
-            <a:endParaRPr lang="pt-BR" sz="2400" dirty="0">
+            <a:pPr algn="just">
+              <a:buFontTx/>
+              <a:buChar char="-"/>
+            </a:pPr>
+            <a:r>
+              <a:rPr lang="pt-BR" dirty="0">
+                <a:latin typeface="Times New Roman" panose="02020603050405020304" pitchFamily="18" charset="0"/>
+                <a:cs typeface="Times New Roman" panose="02020603050405020304" pitchFamily="18" charset="0"/>
+              </a:rPr>
+              <a:t>Exercícios de Fixação </a:t>
+            </a:r>
+            <a:r>
+              <a:rPr lang="pt-BR" b="1" dirty="0">
+                <a:latin typeface="Times New Roman" panose="02020603050405020304" pitchFamily="18" charset="0"/>
+                <a:cs typeface="Times New Roman" panose="02020603050405020304" pitchFamily="18" charset="0"/>
+              </a:rPr>
+              <a:t>HTML</a:t>
+            </a:r>
+          </a:p>
+          <a:p>
+            <a:pPr marL="0" indent="0" algn="just">
+              <a:buNone/>
+            </a:pPr>
+            <a:r>
+              <a:rPr lang="pt-BR" dirty="0">
+                <a:latin typeface="Times New Roman" panose="02020603050405020304" pitchFamily="18" charset="0"/>
+                <a:cs typeface="Times New Roman" panose="02020603050405020304" pitchFamily="18" charset="0"/>
+              </a:rPr>
+              <a:t>	</a:t>
+            </a:r>
+            <a:r>
+              <a:rPr lang="pt-BR" b="1" dirty="0">
+                <a:solidFill>
+                  <a:srgbClr val="FF0000"/>
+                </a:solidFill>
+                <a:latin typeface="Times New Roman" panose="02020603050405020304" pitchFamily="18" charset="0"/>
+                <a:cs typeface="Times New Roman" panose="02020603050405020304" pitchFamily="18" charset="0"/>
+              </a:rPr>
+              <a:t>Desafios em Sala de Aula</a:t>
+            </a:r>
+            <a:r>
+              <a:rPr lang="pt-BR" dirty="0">
+                <a:latin typeface="Times New Roman" panose="02020603050405020304" pitchFamily="18" charset="0"/>
+                <a:cs typeface="Times New Roman" panose="02020603050405020304" pitchFamily="18" charset="0"/>
+              </a:rPr>
+              <a:t>.</a:t>
+            </a:r>
+          </a:p>
+          <a:p>
+            <a:pPr marL="0" indent="0" algn="just">
+              <a:buNone/>
+            </a:pPr>
+            <a:r>
+              <a:rPr lang="pt-BR" dirty="0">
+                <a:latin typeface="Times New Roman" panose="02020603050405020304" pitchFamily="18" charset="0"/>
+                <a:cs typeface="Times New Roman" panose="02020603050405020304" pitchFamily="18" charset="0"/>
+              </a:rPr>
+              <a:t>	</a:t>
+            </a:r>
+          </a:p>
+          <a:p>
+            <a:pPr marL="0" indent="0" algn="just">
+              <a:buNone/>
+            </a:pPr>
+            <a:r>
+              <a:rPr lang="es-ES" dirty="0">
+                <a:latin typeface="Times New Roman" panose="02020603050405020304" pitchFamily="18" charset="0"/>
+                <a:cs typeface="Times New Roman" panose="02020603050405020304" pitchFamily="18" charset="0"/>
+              </a:rPr>
+              <a:t>- Quiz HTML</a:t>
+            </a:r>
+          </a:p>
+          <a:p>
+            <a:pPr marL="0" indent="0" algn="just">
+              <a:buNone/>
+            </a:pPr>
+            <a:r>
+              <a:rPr lang="es-ES" dirty="0">
+                <a:latin typeface="Times New Roman" panose="02020603050405020304" pitchFamily="18" charset="0"/>
+                <a:cs typeface="Times New Roman" panose="02020603050405020304" pitchFamily="18" charset="0"/>
+                <a:hlinkClick r:id="rId3"/>
+              </a:rPr>
+              <a:t>https://docs.google.com/forms/d/1sIof5xEJ_sP-fUk_qgOKjhtV25D_a438OowjG30xL1o/prefill</a:t>
+            </a:r>
+            <a:endParaRPr lang="es-ES" dirty="0">
               <a:latin typeface="Times New Roman" panose="02020603050405020304" pitchFamily="18" charset="0"/>
               <a:cs typeface="Times New Roman" panose="02020603050405020304" pitchFamily="18" charset="0"/>
             </a:endParaRPr>
@@ -22448,22 +22654,7 @@
             <a:pPr marL="0" indent="0" algn="just">
               <a:buNone/>
             </a:pPr>
-            <a:r>
-              <a:rPr lang="pt-BR" sz="2400" dirty="0">
-                <a:latin typeface="Times New Roman" panose="02020603050405020304" pitchFamily="18" charset="0"/>
-                <a:cs typeface="Times New Roman" panose="02020603050405020304" pitchFamily="18" charset="0"/>
-              </a:rPr>
-              <a:t>[2] Site: </a:t>
-            </a:r>
-            <a:r>
-              <a:rPr lang="pt-BR" sz="2400" dirty="0">
-                <a:latin typeface="Times New Roman" panose="02020603050405020304" pitchFamily="18" charset="0"/>
-                <a:cs typeface="Times New Roman" panose="02020603050405020304" pitchFamily="18" charset="0"/>
-                <a:hlinkClick r:id="rId3"/>
-              </a:rPr>
-              <a:t>https://developer.mozilla.org/pt-BR/docs/Web/HTML</a:t>
-            </a:r>
-            <a:endParaRPr lang="pt-BR" sz="2400" dirty="0">
+            <a:endParaRPr lang="es-ES" dirty="0">
               <a:latin typeface="Times New Roman" panose="02020603050405020304" pitchFamily="18" charset="0"/>
               <a:cs typeface="Times New Roman" panose="02020603050405020304" pitchFamily="18" charset="0"/>
             </a:endParaRPr>
@@ -22472,33 +22663,22 @@
             <a:pPr marL="0" indent="0" algn="just">
               <a:buNone/>
             </a:pPr>
-            <a:endParaRPr lang="pt-BR" sz="2400" dirty="0">
+            <a:endParaRPr lang="pt-BR" dirty="0">
               <a:latin typeface="Times New Roman" panose="02020603050405020304" pitchFamily="18" charset="0"/>
               <a:cs typeface="Times New Roman" panose="02020603050405020304" pitchFamily="18" charset="0"/>
             </a:endParaRPr>
           </a:p>
           <a:p>
-            <a:pPr marL="0" indent="0" algn="just">
-              <a:buNone/>
-            </a:pPr>
-            <a:r>
-              <a:rPr lang="pt-BR" sz="2400" dirty="0">
-                <a:latin typeface="Times New Roman" panose="02020603050405020304" pitchFamily="18" charset="0"/>
-                <a:cs typeface="Times New Roman" panose="02020603050405020304" pitchFamily="18" charset="0"/>
-              </a:rPr>
-              <a:t>[3] Site: </a:t>
-            </a:r>
-            <a:r>
-              <a:rPr lang="pt-BR" sz="2400" dirty="0">
-                <a:latin typeface="Times New Roman" panose="02020603050405020304" pitchFamily="18" charset="0"/>
-                <a:cs typeface="Times New Roman" panose="02020603050405020304" pitchFamily="18" charset="0"/>
-                <a:hlinkClick r:id="rId4"/>
-              </a:rPr>
-              <a:t>https://www.w3schools.com/html/</a:t>
-            </a:r>
-            <a:endParaRPr lang="pt-BR" sz="2400" dirty="0">
+            <a:pPr algn="just"/>
+            <a:endParaRPr lang="pt-BR" dirty="0">
               <a:latin typeface="Times New Roman" panose="02020603050405020304" pitchFamily="18" charset="0"/>
               <a:cs typeface="Times New Roman" panose="02020603050405020304" pitchFamily="18" charset="0"/>
+            </a:endParaRPr>
+          </a:p>
+          <a:p>
+            <a:pPr algn="just"/>
+            <a:endParaRPr lang="pt-BR" dirty="0">
+              <a:latin typeface="Calibri" panose="020F0502020204030204" pitchFamily="34" charset="0"/>
             </a:endParaRPr>
           </a:p>
         </p:txBody>
@@ -22506,7 +22686,7 @@
     </p:spTree>
     <p:extLst>
       <p:ext uri="{BB962C8B-B14F-4D97-AF65-F5344CB8AC3E}">
-        <p14:creationId xmlns:p14="http://schemas.microsoft.com/office/powerpoint/2010/main" val="1115311843"/>
+        <p14:creationId xmlns:p14="http://schemas.microsoft.com/office/powerpoint/2010/main" val="2470652989"/>
       </p:ext>
     </p:extLst>
   </p:cSld>
@@ -22771,6 +22951,220 @@
 </file>
 
 <file path=ppt/slides/slide50.xml><?xml version="1.0" encoding="utf-8"?>
+<p:sld xmlns:a="http://schemas.openxmlformats.org/drawingml/2006/main" xmlns:r="http://schemas.openxmlformats.org/officeDocument/2006/relationships" xmlns:p="http://schemas.openxmlformats.org/presentationml/2006/main">
+  <p:cSld>
+    <p:spTree>
+      <p:nvGrpSpPr>
+        <p:cNvPr id="1" name=""/>
+        <p:cNvGrpSpPr/>
+        <p:nvPr/>
+      </p:nvGrpSpPr>
+      <p:grpSpPr>
+        <a:xfrm>
+          <a:off x="0" y="0"/>
+          <a:ext cx="0" cy="0"/>
+          <a:chOff x="0" y="0"/>
+          <a:chExt cx="0" cy="0"/>
+        </a:xfrm>
+      </p:grpSpPr>
+      <p:sp>
+        <p:nvSpPr>
+          <p:cNvPr id="6" name="Title 1"/>
+          <p:cNvSpPr>
+            <a:spLocks noGrp="1"/>
+          </p:cNvSpPr>
+          <p:nvPr>
+            <p:ph type="title"/>
+          </p:nvPr>
+        </p:nvSpPr>
+        <p:spPr>
+          <a:xfrm>
+            <a:off x="457200" y="205980"/>
+            <a:ext cx="8229600" cy="857251"/>
+          </a:xfrm>
+        </p:spPr>
+        <p:txBody>
+          <a:bodyPr>
+            <a:normAutofit/>
+          </a:bodyPr>
+          <a:lstStyle/>
+          <a:p>
+            <a:r>
+              <a:rPr lang="en-US" b="1" dirty="0" err="1">
+                <a:solidFill>
+                  <a:srgbClr val="0070C0"/>
+                </a:solidFill>
+              </a:rPr>
+              <a:t>Referências</a:t>
+            </a:r>
+            <a:r>
+              <a:rPr lang="en-US" b="1" dirty="0">
+                <a:solidFill>
+                  <a:srgbClr val="0070C0"/>
+                </a:solidFill>
+              </a:rPr>
+              <a:t> </a:t>
+            </a:r>
+            <a:r>
+              <a:rPr lang="en-US" b="1" dirty="0" err="1">
+                <a:solidFill>
+                  <a:srgbClr val="0070C0"/>
+                </a:solidFill>
+              </a:rPr>
+              <a:t>Bibliográficas</a:t>
+            </a:r>
+            <a:endParaRPr lang="en-US" b="1" dirty="0">
+              <a:solidFill>
+                <a:srgbClr val="0070C0"/>
+              </a:solidFill>
+            </a:endParaRPr>
+          </a:p>
+        </p:txBody>
+      </p:sp>
+      <p:sp>
+        <p:nvSpPr>
+          <p:cNvPr id="8" name="Text Placeholder 2"/>
+          <p:cNvSpPr>
+            <a:spLocks noGrp="1"/>
+          </p:cNvSpPr>
+          <p:nvPr>
+            <p:ph type="body" sz="half" idx="1"/>
+          </p:nvPr>
+        </p:nvSpPr>
+        <p:spPr>
+          <a:xfrm>
+            <a:off x="142865" y="1200151"/>
+            <a:ext cx="8865056" cy="3394472"/>
+          </a:xfrm>
+        </p:spPr>
+        <p:txBody>
+          <a:bodyPr>
+            <a:noAutofit/>
+          </a:bodyPr>
+          <a:lstStyle/>
+          <a:p>
+            <a:pPr marL="0" indent="0" algn="just">
+              <a:buNone/>
+            </a:pPr>
+            <a:r>
+              <a:rPr lang="pt-BR" sz="2400" dirty="0">
+                <a:latin typeface="Times New Roman" panose="02020603050405020304" pitchFamily="18" charset="0"/>
+                <a:cs typeface="Times New Roman" panose="02020603050405020304" pitchFamily="18" charset="0"/>
+              </a:rPr>
+              <a:t>[1] </a:t>
+            </a:r>
+            <a:r>
+              <a:rPr lang="pt-BR" sz="2400" b="1" dirty="0">
+                <a:latin typeface="Times New Roman" panose="02020603050405020304" pitchFamily="18" charset="0"/>
+                <a:cs typeface="Times New Roman" panose="02020603050405020304" pitchFamily="18" charset="0"/>
+              </a:rPr>
+              <a:t>SILVA</a:t>
+            </a:r>
+            <a:r>
+              <a:rPr lang="pt-BR" sz="2400" dirty="0">
+                <a:latin typeface="Times New Roman" panose="02020603050405020304" pitchFamily="18" charset="0"/>
+                <a:cs typeface="Times New Roman" panose="02020603050405020304" pitchFamily="18" charset="0"/>
+              </a:rPr>
+              <a:t>, Mauricio Samy. HTML5: a linguagem de marcação que revolucionou a web. </a:t>
+            </a:r>
+            <a:r>
+              <a:rPr lang="pt-BR" sz="2400" dirty="0" err="1">
+                <a:latin typeface="Times New Roman" panose="02020603050405020304" pitchFamily="18" charset="0"/>
+                <a:cs typeface="Times New Roman" panose="02020603050405020304" pitchFamily="18" charset="0"/>
+              </a:rPr>
+              <a:t>Novatec</a:t>
+            </a:r>
+            <a:r>
+              <a:rPr lang="pt-BR" sz="2400" dirty="0">
+                <a:latin typeface="Times New Roman" panose="02020603050405020304" pitchFamily="18" charset="0"/>
+                <a:cs typeface="Times New Roman" panose="02020603050405020304" pitchFamily="18" charset="0"/>
+              </a:rPr>
+              <a:t> Editora, 2019.</a:t>
+            </a:r>
+          </a:p>
+          <a:p>
+            <a:pPr marL="0" indent="0" algn="just">
+              <a:buNone/>
+            </a:pPr>
+            <a:endParaRPr lang="pt-BR" sz="2400" dirty="0">
+              <a:latin typeface="Times New Roman" panose="02020603050405020304" pitchFamily="18" charset="0"/>
+              <a:cs typeface="Times New Roman" panose="02020603050405020304" pitchFamily="18" charset="0"/>
+            </a:endParaRPr>
+          </a:p>
+          <a:p>
+            <a:pPr marL="0" indent="0" algn="just">
+              <a:buNone/>
+            </a:pPr>
+            <a:r>
+              <a:rPr lang="pt-BR" sz="2400" dirty="0">
+                <a:latin typeface="Times New Roman" panose="02020603050405020304" pitchFamily="18" charset="0"/>
+                <a:cs typeface="Times New Roman" panose="02020603050405020304" pitchFamily="18" charset="0"/>
+              </a:rPr>
+              <a:t>[2] Site: </a:t>
+            </a:r>
+            <a:r>
+              <a:rPr lang="pt-BR" sz="2400" dirty="0">
+                <a:latin typeface="Times New Roman" panose="02020603050405020304" pitchFamily="18" charset="0"/>
+                <a:cs typeface="Times New Roman" panose="02020603050405020304" pitchFamily="18" charset="0"/>
+                <a:hlinkClick r:id="rId3"/>
+              </a:rPr>
+              <a:t>https://developer.mozilla.org/pt-BR/docs/Web/HTML</a:t>
+            </a:r>
+            <a:endParaRPr lang="pt-BR" sz="2400" dirty="0">
+              <a:latin typeface="Times New Roman" panose="02020603050405020304" pitchFamily="18" charset="0"/>
+              <a:cs typeface="Times New Roman" panose="02020603050405020304" pitchFamily="18" charset="0"/>
+            </a:endParaRPr>
+          </a:p>
+          <a:p>
+            <a:pPr marL="0" indent="0" algn="just">
+              <a:buNone/>
+            </a:pPr>
+            <a:endParaRPr lang="pt-BR" sz="2400" dirty="0">
+              <a:latin typeface="Times New Roman" panose="02020603050405020304" pitchFamily="18" charset="0"/>
+              <a:cs typeface="Times New Roman" panose="02020603050405020304" pitchFamily="18" charset="0"/>
+            </a:endParaRPr>
+          </a:p>
+          <a:p>
+            <a:pPr marL="0" indent="0" algn="just">
+              <a:buNone/>
+            </a:pPr>
+            <a:r>
+              <a:rPr lang="pt-BR" sz="2400" dirty="0">
+                <a:latin typeface="Times New Roman" panose="02020603050405020304" pitchFamily="18" charset="0"/>
+                <a:cs typeface="Times New Roman" panose="02020603050405020304" pitchFamily="18" charset="0"/>
+              </a:rPr>
+              <a:t>[3] Site: </a:t>
+            </a:r>
+            <a:r>
+              <a:rPr lang="pt-BR" sz="2400" dirty="0">
+                <a:latin typeface="Times New Roman" panose="02020603050405020304" pitchFamily="18" charset="0"/>
+                <a:cs typeface="Times New Roman" panose="02020603050405020304" pitchFamily="18" charset="0"/>
+                <a:hlinkClick r:id="rId4"/>
+              </a:rPr>
+              <a:t>https://www.w3schools.com/html/</a:t>
+            </a:r>
+            <a:endParaRPr lang="pt-BR" sz="2400" dirty="0">
+              <a:latin typeface="Times New Roman" panose="02020603050405020304" pitchFamily="18" charset="0"/>
+              <a:cs typeface="Times New Roman" panose="02020603050405020304" pitchFamily="18" charset="0"/>
+            </a:endParaRPr>
+          </a:p>
+        </p:txBody>
+      </p:sp>
+    </p:spTree>
+    <p:extLst>
+      <p:ext uri="{BB962C8B-B14F-4D97-AF65-F5344CB8AC3E}">
+        <p14:creationId xmlns:p14="http://schemas.microsoft.com/office/powerpoint/2010/main" val="1115311843"/>
+      </p:ext>
+    </p:extLst>
+  </p:cSld>
+  <p:clrMapOvr>
+    <a:masterClrMapping/>
+  </p:clrMapOvr>
+  <p:transition spd="med"/>
+</p:sld>
+</file>
+
+<file path=ppt/slides/slide51.xml><?xml version="1.0" encoding="utf-8"?>
 <p:sld xmlns:a="http://schemas.openxmlformats.org/drawingml/2006/main" xmlns:r="http://schemas.openxmlformats.org/officeDocument/2006/relationships" xmlns:p="http://schemas.openxmlformats.org/presentationml/2006/main">
   <p:cSld>
     <p:spTree>

</xml_diff>